<commit_message>
Combining RoutingService and UI in sprint 3.
</commit_message>
<xml_diff>
--- a/EdaWorkshop_Intro.pptx
+++ b/EdaWorkshop_Intro.pptx
@@ -256,7 +256,7 @@
           <a:p>
             <a:fld id="{0B5D536D-AE8C-4EAC-8CEB-B18A64A144B4}" type="datetimeFigureOut">
               <a:rPr lang="en-US" smtClean="0"/>
-              <a:t>9/19/2021</a:t>
+              <a:t>9/25/2021</a:t>
             </a:fld>
             <a:endParaRPr lang="en-US"/>
           </a:p>
@@ -426,7 +426,7 @@
           <a:p>
             <a:fld id="{0B5D536D-AE8C-4EAC-8CEB-B18A64A144B4}" type="datetimeFigureOut">
               <a:rPr lang="en-US" smtClean="0"/>
-              <a:t>9/19/2021</a:t>
+              <a:t>9/25/2021</a:t>
             </a:fld>
             <a:endParaRPr lang="en-US"/>
           </a:p>
@@ -606,7 +606,7 @@
           <a:p>
             <a:fld id="{0B5D536D-AE8C-4EAC-8CEB-B18A64A144B4}" type="datetimeFigureOut">
               <a:rPr lang="en-US" smtClean="0"/>
-              <a:t>9/19/2021</a:t>
+              <a:t>9/25/2021</a:t>
             </a:fld>
             <a:endParaRPr lang="en-US"/>
           </a:p>
@@ -776,7 +776,7 @@
           <a:p>
             <a:fld id="{0B5D536D-AE8C-4EAC-8CEB-B18A64A144B4}" type="datetimeFigureOut">
               <a:rPr lang="en-US" smtClean="0"/>
-              <a:t>9/19/2021</a:t>
+              <a:t>9/25/2021</a:t>
             </a:fld>
             <a:endParaRPr lang="en-US"/>
           </a:p>
@@ -1022,7 +1022,7 @@
           <a:p>
             <a:fld id="{0B5D536D-AE8C-4EAC-8CEB-B18A64A144B4}" type="datetimeFigureOut">
               <a:rPr lang="en-US" smtClean="0"/>
-              <a:t>9/19/2021</a:t>
+              <a:t>9/25/2021</a:t>
             </a:fld>
             <a:endParaRPr lang="en-US"/>
           </a:p>
@@ -1254,7 +1254,7 @@
           <a:p>
             <a:fld id="{0B5D536D-AE8C-4EAC-8CEB-B18A64A144B4}" type="datetimeFigureOut">
               <a:rPr lang="en-US" smtClean="0"/>
-              <a:t>9/19/2021</a:t>
+              <a:t>9/25/2021</a:t>
             </a:fld>
             <a:endParaRPr lang="en-US"/>
           </a:p>
@@ -1621,7 +1621,7 @@
           <a:p>
             <a:fld id="{0B5D536D-AE8C-4EAC-8CEB-B18A64A144B4}" type="datetimeFigureOut">
               <a:rPr lang="en-US" smtClean="0"/>
-              <a:t>9/19/2021</a:t>
+              <a:t>9/25/2021</a:t>
             </a:fld>
             <a:endParaRPr lang="en-US"/>
           </a:p>
@@ -1739,7 +1739,7 @@
           <a:p>
             <a:fld id="{0B5D536D-AE8C-4EAC-8CEB-B18A64A144B4}" type="datetimeFigureOut">
               <a:rPr lang="en-US" smtClean="0"/>
-              <a:t>9/19/2021</a:t>
+              <a:t>9/25/2021</a:t>
             </a:fld>
             <a:endParaRPr lang="en-US"/>
           </a:p>
@@ -1834,7 +1834,7 @@
           <a:p>
             <a:fld id="{0B5D536D-AE8C-4EAC-8CEB-B18A64A144B4}" type="datetimeFigureOut">
               <a:rPr lang="en-US" smtClean="0"/>
-              <a:t>9/19/2021</a:t>
+              <a:t>9/25/2021</a:t>
             </a:fld>
             <a:endParaRPr lang="en-US"/>
           </a:p>
@@ -2111,7 +2111,7 @@
           <a:p>
             <a:fld id="{0B5D536D-AE8C-4EAC-8CEB-B18A64A144B4}" type="datetimeFigureOut">
               <a:rPr lang="en-US" smtClean="0"/>
-              <a:t>9/19/2021</a:t>
+              <a:t>9/25/2021</a:t>
             </a:fld>
             <a:endParaRPr lang="en-US"/>
           </a:p>
@@ -2364,7 +2364,7 @@
           <a:p>
             <a:fld id="{0B5D536D-AE8C-4EAC-8CEB-B18A64A144B4}" type="datetimeFigureOut">
               <a:rPr lang="en-US" smtClean="0"/>
-              <a:t>9/19/2021</a:t>
+              <a:t>9/25/2021</a:t>
             </a:fld>
             <a:endParaRPr lang="en-US"/>
           </a:p>
@@ -2577,7 +2577,7 @@
           <a:p>
             <a:fld id="{0B5D536D-AE8C-4EAC-8CEB-B18A64A144B4}" type="datetimeFigureOut">
               <a:rPr lang="en-US" smtClean="0"/>
-              <a:t>9/19/2021</a:t>
+              <a:t>9/25/2021</a:t>
             </a:fld>
             <a:endParaRPr lang="en-US"/>
           </a:p>

</xml_diff>